<commit_message>
Template Presentation Version 2
</commit_message>
<xml_diff>
--- a/team MINDACTIVITY.pptx
+++ b/team MINDACTIVITY.pptx
@@ -5,7 +5,7 @@
     <p:sldMasterId id="2147483648" r:id="rId1"/>
   </p:sldMasterIdLst>
   <p:notesMasterIdLst>
-    <p:notesMasterId r:id="rId17"/>
+    <p:notesMasterId r:id="rId23"/>
   </p:notesMasterIdLst>
   <p:sldIdLst>
     <p:sldId id="256" r:id="rId2"/>
@@ -19,10 +19,16 @@
     <p:sldId id="266" r:id="rId10"/>
     <p:sldId id="267" r:id="rId11"/>
     <p:sldId id="262" r:id="rId12"/>
-    <p:sldId id="269" r:id="rId13"/>
-    <p:sldId id="268" r:id="rId14"/>
-    <p:sldId id="265" r:id="rId15"/>
-    <p:sldId id="270" r:id="rId16"/>
+    <p:sldId id="275" r:id="rId13"/>
+    <p:sldId id="276" r:id="rId14"/>
+    <p:sldId id="269" r:id="rId15"/>
+    <p:sldId id="268" r:id="rId16"/>
+    <p:sldId id="271" r:id="rId17"/>
+    <p:sldId id="272" r:id="rId18"/>
+    <p:sldId id="265" r:id="rId19"/>
+    <p:sldId id="270" r:id="rId20"/>
+    <p:sldId id="273" r:id="rId21"/>
+    <p:sldId id="274" r:id="rId22"/>
   </p:sldIdLst>
   <p:sldSz cx="12192000" cy="6858000"/>
   <p:notesSz cx="6858000" cy="9144000"/>
@@ -4357,6 +4363,552 @@
           <p:cNvPr id="2" name="Title 1">
             <a:extLst>
               <a:ext uri="{FF2B5EF4-FFF2-40B4-BE49-F238E27FC236}">
+                <a16:creationId xmlns:a16="http://schemas.microsoft.com/office/drawing/2014/main" id="{18135565-DC25-0CB3-74CD-E731B0A913AD}"/>
+              </a:ext>
+            </a:extLst>
+          </p:cNvPr>
+          <p:cNvSpPr>
+            <a:spLocks noGrp="1"/>
+          </p:cNvSpPr>
+          <p:nvPr>
+            <p:ph type="title"/>
+          </p:nvPr>
+        </p:nvSpPr>
+        <p:spPr/>
+        <p:txBody>
+          <a:bodyPr/>
+          <a:lstStyle/>
+          <a:p>
+            <a:pPr algn="ctr"/>
+            <a:r>
+              <a:rPr lang="en-GB" dirty="0">
+                <a:latin typeface="Montserrat Alternates Black" panose="00000A00000000000000" pitchFamily="2" charset="0"/>
+              </a:rPr>
+              <a:t>User Personas</a:t>
+            </a:r>
+          </a:p>
+        </p:txBody>
+      </p:sp>
+      <p:sp>
+        <p:nvSpPr>
+          <p:cNvPr id="4" name="TextBox 3">
+            <a:extLst>
+              <a:ext uri="{FF2B5EF4-FFF2-40B4-BE49-F238E27FC236}">
+                <a16:creationId xmlns:a16="http://schemas.microsoft.com/office/drawing/2014/main" id="{A8BDB7CE-E305-DDE1-57B9-0D0556B97D45}"/>
+              </a:ext>
+            </a:extLst>
+          </p:cNvPr>
+          <p:cNvSpPr txBox="1"/>
+          <p:nvPr/>
+        </p:nvSpPr>
+        <p:spPr>
+          <a:xfrm>
+            <a:off x="731520" y="1995100"/>
+            <a:ext cx="5281895" cy="2031325"/>
+          </a:xfrm>
+          <a:prstGeom prst="rect">
+            <a:avLst/>
+          </a:prstGeom>
+          <a:noFill/>
+        </p:spPr>
+        <p:txBody>
+          <a:bodyPr wrap="none" rtlCol="0">
+            <a:spAutoFit/>
+          </a:bodyPr>
+          <a:lstStyle/>
+          <a:p>
+            <a:r>
+              <a:rPr lang="en-GB" b="1" dirty="0"/>
+              <a:t>Name</a:t>
+            </a:r>
+            <a:r>
+              <a:rPr lang="en-GB" dirty="0"/>
+              <a:t>: John</a:t>
+            </a:r>
+            <a:br>
+              <a:rPr lang="en-GB" dirty="0"/>
+            </a:br>
+            <a:r>
+              <a:rPr lang="en-GB" b="1" dirty="0"/>
+              <a:t>Age: </a:t>
+            </a:r>
+            <a:r>
+              <a:rPr lang="en-GB" dirty="0"/>
+              <a:t>55</a:t>
+            </a:r>
+          </a:p>
+          <a:p>
+            <a:r>
+              <a:rPr lang="en-GB" b="1" dirty="0"/>
+              <a:t>Gender: </a:t>
+            </a:r>
+            <a:r>
+              <a:rPr lang="en-GB" dirty="0"/>
+              <a:t>male</a:t>
+            </a:r>
+          </a:p>
+          <a:p>
+            <a:r>
+              <a:rPr lang="en-GB" b="1" dirty="0"/>
+              <a:t>Education: </a:t>
+            </a:r>
+            <a:r>
+              <a:rPr lang="en-GB" dirty="0"/>
+              <a:t>MBA</a:t>
+            </a:r>
+          </a:p>
+          <a:p>
+            <a:r>
+              <a:rPr lang="en-GB" b="1" dirty="0"/>
+              <a:t>Previous Occupation: </a:t>
+            </a:r>
+            <a:r>
+              <a:rPr lang="en-GB" dirty="0"/>
+              <a:t>Director/Employee Assistant Div.</a:t>
+            </a:r>
+          </a:p>
+          <a:p>
+            <a:r>
+              <a:rPr lang="en-GB" b="1" dirty="0"/>
+              <a:t>Extroversion Type: </a:t>
+            </a:r>
+            <a:r>
+              <a:rPr lang="en-GB" dirty="0"/>
+              <a:t>Extrovert</a:t>
+            </a:r>
+          </a:p>
+          <a:p>
+            <a:r>
+              <a:rPr lang="en-GB" b="1" dirty="0"/>
+              <a:t>Level of physical activity: </a:t>
+            </a:r>
+            <a:r>
+              <a:rPr lang="en-GB" dirty="0"/>
+              <a:t>Sedentary</a:t>
+            </a:r>
+          </a:p>
+        </p:txBody>
+      </p:sp>
+      <p:sp>
+        <p:nvSpPr>
+          <p:cNvPr id="6" name="TextBox 5">
+            <a:extLst>
+              <a:ext uri="{FF2B5EF4-FFF2-40B4-BE49-F238E27FC236}">
+                <a16:creationId xmlns:a16="http://schemas.microsoft.com/office/drawing/2014/main" id="{025E4C16-C58F-E0E8-59D1-83AE0B629CCC}"/>
+              </a:ext>
+            </a:extLst>
+          </p:cNvPr>
+          <p:cNvSpPr txBox="1"/>
+          <p:nvPr/>
+        </p:nvSpPr>
+        <p:spPr>
+          <a:xfrm>
+            <a:off x="7843520" y="2133600"/>
+            <a:ext cx="2834640" cy="1754326"/>
+          </a:xfrm>
+          <a:prstGeom prst="rect">
+            <a:avLst/>
+          </a:prstGeom>
+          <a:noFill/>
+        </p:spPr>
+        <p:txBody>
+          <a:bodyPr wrap="square" rtlCol="0">
+            <a:spAutoFit/>
+          </a:bodyPr>
+          <a:lstStyle/>
+          <a:p>
+            <a:r>
+              <a:rPr lang="en-GB" dirty="0">
+                <a:solidFill>
+                  <a:srgbClr val="FF0000"/>
+                </a:solidFill>
+              </a:rPr>
+              <a:t>As an extroverted </a:t>
+            </a:r>
+            <a:r>
+              <a:rPr lang="en-GB" dirty="0" err="1">
+                <a:solidFill>
+                  <a:srgbClr val="FF0000"/>
+                </a:solidFill>
+              </a:rPr>
+              <a:t>bootcamper</a:t>
+            </a:r>
+            <a:r>
+              <a:rPr lang="en-GB" dirty="0">
+                <a:solidFill>
+                  <a:srgbClr val="FF0000"/>
+                </a:solidFill>
+              </a:rPr>
+              <a:t>, I want an app that includes an interactive blog feature so that I can connect with other </a:t>
+            </a:r>
+            <a:r>
+              <a:rPr lang="en-GB" dirty="0" err="1">
+                <a:solidFill>
+                  <a:srgbClr val="FF0000"/>
+                </a:solidFill>
+              </a:rPr>
+              <a:t>bootcampers</a:t>
+            </a:r>
+            <a:r>
+              <a:rPr lang="en-GB" dirty="0">
+                <a:solidFill>
+                  <a:srgbClr val="FF0000"/>
+                </a:solidFill>
+              </a:rPr>
+              <a:t>.</a:t>
+            </a:r>
+          </a:p>
+        </p:txBody>
+      </p:sp>
+      <p:sp>
+        <p:nvSpPr>
+          <p:cNvPr id="7" name="TextBox 6">
+            <a:extLst>
+              <a:ext uri="{FF2B5EF4-FFF2-40B4-BE49-F238E27FC236}">
+                <a16:creationId xmlns:a16="http://schemas.microsoft.com/office/drawing/2014/main" id="{5B5214BB-0682-8C09-EFC6-21CF0995FFFE}"/>
+              </a:ext>
+            </a:extLst>
+          </p:cNvPr>
+          <p:cNvSpPr txBox="1"/>
+          <p:nvPr/>
+        </p:nvSpPr>
+        <p:spPr>
+          <a:xfrm>
+            <a:off x="7843520" y="4330838"/>
+            <a:ext cx="3474720" cy="1477328"/>
+          </a:xfrm>
+          <a:prstGeom prst="rect">
+            <a:avLst/>
+          </a:prstGeom>
+          <a:noFill/>
+        </p:spPr>
+        <p:txBody>
+          <a:bodyPr wrap="square" rtlCol="0">
+            <a:spAutoFit/>
+          </a:bodyPr>
+          <a:lstStyle/>
+          <a:p>
+            <a:r>
+              <a:rPr lang="en-GB" dirty="0">
+                <a:solidFill>
+                  <a:srgbClr val="FF0000"/>
+                </a:solidFill>
+              </a:rPr>
+              <a:t>As a </a:t>
+            </a:r>
+            <a:r>
+              <a:rPr lang="en-GB" dirty="0" err="1">
+                <a:solidFill>
+                  <a:srgbClr val="FF0000"/>
+                </a:solidFill>
+              </a:rPr>
+              <a:t>bootcamper</a:t>
+            </a:r>
+            <a:r>
+              <a:rPr lang="en-GB" dirty="0">
+                <a:solidFill>
+                  <a:srgbClr val="FF0000"/>
+                </a:solidFill>
+              </a:rPr>
+              <a:t> with low level of physical activity, I want to use a stress relief app with a timer,</a:t>
+            </a:r>
+          </a:p>
+          <a:p>
+            <a:r>
+              <a:rPr lang="en-GB" dirty="0">
+                <a:solidFill>
+                  <a:srgbClr val="FF0000"/>
+                </a:solidFill>
+              </a:rPr>
+              <a:t>So that I can use it for exercise as well as meditation</a:t>
+            </a:r>
+          </a:p>
+        </p:txBody>
+      </p:sp>
+    </p:spTree>
+    <p:extLst>
+      <p:ext uri="{BB962C8B-B14F-4D97-AF65-F5344CB8AC3E}">
+        <p14:creationId xmlns:p14="http://schemas.microsoft.com/office/powerpoint/2010/main" val="1988930082"/>
+      </p:ext>
+    </p:extLst>
+  </p:cSld>
+  <p:clrMapOvr>
+    <a:masterClrMapping/>
+  </p:clrMapOvr>
+</p:sld>
+</file>
+
+<file path=ppt/slides/slide13.xml><?xml version="1.0" encoding="utf-8"?>
+<p:sld xmlns:a="http://schemas.openxmlformats.org/drawingml/2006/main" xmlns:r="http://schemas.openxmlformats.org/officeDocument/2006/relationships" xmlns:p="http://schemas.openxmlformats.org/presentationml/2006/main">
+  <p:cSld>
+    <p:spTree>
+      <p:nvGrpSpPr>
+        <p:cNvPr id="1" name=""/>
+        <p:cNvGrpSpPr/>
+        <p:nvPr/>
+      </p:nvGrpSpPr>
+      <p:grpSpPr>
+        <a:xfrm>
+          <a:off x="0" y="0"/>
+          <a:ext cx="0" cy="0"/>
+          <a:chOff x="0" y="0"/>
+          <a:chExt cx="0" cy="0"/>
+        </a:xfrm>
+      </p:grpSpPr>
+      <p:sp>
+        <p:nvSpPr>
+          <p:cNvPr id="4" name="TextBox 3">
+            <a:extLst>
+              <a:ext uri="{FF2B5EF4-FFF2-40B4-BE49-F238E27FC236}">
+                <a16:creationId xmlns:a16="http://schemas.microsoft.com/office/drawing/2014/main" id="{E33418A5-F53E-A7B2-BD70-56442C5A8C2C}"/>
+              </a:ext>
+            </a:extLst>
+          </p:cNvPr>
+          <p:cNvSpPr txBox="1"/>
+          <p:nvPr/>
+        </p:nvSpPr>
+        <p:spPr>
+          <a:xfrm>
+            <a:off x="1083070" y="2214602"/>
+            <a:ext cx="3739550" cy="2031325"/>
+          </a:xfrm>
+          <a:prstGeom prst="rect">
+            <a:avLst/>
+          </a:prstGeom>
+          <a:noFill/>
+        </p:spPr>
+        <p:txBody>
+          <a:bodyPr wrap="none" rtlCol="0">
+            <a:spAutoFit/>
+          </a:bodyPr>
+          <a:lstStyle/>
+          <a:p>
+            <a:r>
+              <a:rPr lang="en-GB" b="1" dirty="0"/>
+              <a:t>Name: </a:t>
+            </a:r>
+            <a:r>
+              <a:rPr lang="en-GB" dirty="0"/>
+              <a:t>Esther</a:t>
+            </a:r>
+          </a:p>
+          <a:p>
+            <a:r>
+              <a:rPr lang="en-GB" b="1" dirty="0"/>
+              <a:t>Age: </a:t>
+            </a:r>
+            <a:r>
+              <a:rPr lang="en-GB" dirty="0"/>
+              <a:t>30</a:t>
+            </a:r>
+          </a:p>
+          <a:p>
+            <a:r>
+              <a:rPr lang="en-GB" b="1" dirty="0"/>
+              <a:t>Gender: </a:t>
+            </a:r>
+            <a:r>
+              <a:rPr lang="en-GB" dirty="0"/>
+              <a:t>female</a:t>
+            </a:r>
+          </a:p>
+          <a:p>
+            <a:r>
+              <a:rPr lang="en-GB" b="1" dirty="0"/>
+              <a:t>Education: </a:t>
+            </a:r>
+            <a:r>
+              <a:rPr lang="en-GB" dirty="0"/>
+              <a:t>Psychology A-Levels</a:t>
+            </a:r>
+          </a:p>
+          <a:p>
+            <a:r>
+              <a:rPr lang="en-GB" b="1" dirty="0"/>
+              <a:t>Previous Occupation: </a:t>
+            </a:r>
+            <a:r>
+              <a:rPr lang="en-GB" dirty="0"/>
+              <a:t>self-employed</a:t>
+            </a:r>
+          </a:p>
+          <a:p>
+            <a:r>
+              <a:rPr lang="en-GB" b="1" dirty="0"/>
+              <a:t>Extroversion Type: </a:t>
+            </a:r>
+            <a:r>
+              <a:rPr lang="en-GB" dirty="0"/>
+              <a:t>Introvert</a:t>
+            </a:r>
+          </a:p>
+          <a:p>
+            <a:r>
+              <a:rPr lang="en-GB" b="1" dirty="0"/>
+              <a:t>Level of physical activity: </a:t>
+            </a:r>
+            <a:r>
+              <a:rPr lang="en-GB" dirty="0"/>
+              <a:t>Quite active</a:t>
+            </a:r>
+          </a:p>
+        </p:txBody>
+      </p:sp>
+      <p:sp>
+        <p:nvSpPr>
+          <p:cNvPr id="5" name="TextBox 4">
+            <a:extLst>
+              <a:ext uri="{FF2B5EF4-FFF2-40B4-BE49-F238E27FC236}">
+                <a16:creationId xmlns:a16="http://schemas.microsoft.com/office/drawing/2014/main" id="{59AFCDC2-E92B-6094-790C-9F204D6C55C6}"/>
+              </a:ext>
+            </a:extLst>
+          </p:cNvPr>
+          <p:cNvSpPr txBox="1"/>
+          <p:nvPr/>
+        </p:nvSpPr>
+        <p:spPr>
+          <a:xfrm>
+            <a:off x="6461760" y="1997392"/>
+            <a:ext cx="3434080" cy="1477328"/>
+          </a:xfrm>
+          <a:prstGeom prst="rect">
+            <a:avLst/>
+          </a:prstGeom>
+          <a:noFill/>
+        </p:spPr>
+        <p:txBody>
+          <a:bodyPr wrap="square" rtlCol="0">
+            <a:spAutoFit/>
+          </a:bodyPr>
+          <a:lstStyle/>
+          <a:p>
+            <a:r>
+              <a:rPr lang="en-GB" dirty="0">
+                <a:solidFill>
+                  <a:srgbClr val="546BAB"/>
+                </a:solidFill>
+              </a:rPr>
+              <a:t>As an introverted </a:t>
+            </a:r>
+            <a:r>
+              <a:rPr lang="en-GB" dirty="0" err="1">
+                <a:solidFill>
+                  <a:srgbClr val="546BAB"/>
+                </a:solidFill>
+              </a:rPr>
+              <a:t>bootcamper</a:t>
+            </a:r>
+            <a:r>
+              <a:rPr lang="en-GB" dirty="0">
+                <a:solidFill>
+                  <a:srgbClr val="546BAB"/>
+                </a:solidFill>
+              </a:rPr>
+              <a:t>, I want an app which includes a meditation timer, so that I can spend some time in silence with my own mind</a:t>
+            </a:r>
+          </a:p>
+        </p:txBody>
+      </p:sp>
+      <p:sp>
+        <p:nvSpPr>
+          <p:cNvPr id="6" name="TextBox 5">
+            <a:extLst>
+              <a:ext uri="{FF2B5EF4-FFF2-40B4-BE49-F238E27FC236}">
+                <a16:creationId xmlns:a16="http://schemas.microsoft.com/office/drawing/2014/main" id="{2F86C95A-64F9-05C9-7B59-4607586A46F7}"/>
+              </a:ext>
+            </a:extLst>
+          </p:cNvPr>
+          <p:cNvSpPr txBox="1"/>
+          <p:nvPr/>
+        </p:nvSpPr>
+        <p:spPr>
+          <a:xfrm>
+            <a:off x="6461760" y="3870007"/>
+            <a:ext cx="4480560" cy="923330"/>
+          </a:xfrm>
+          <a:prstGeom prst="rect">
+            <a:avLst/>
+          </a:prstGeom>
+          <a:noFill/>
+        </p:spPr>
+        <p:txBody>
+          <a:bodyPr wrap="square" rtlCol="0">
+            <a:spAutoFit/>
+          </a:bodyPr>
+          <a:lstStyle/>
+          <a:p>
+            <a:r>
+              <a:rPr lang="en-GB" dirty="0">
+                <a:solidFill>
+                  <a:srgbClr val="546BAB"/>
+                </a:solidFill>
+              </a:rPr>
+              <a:t>As a </a:t>
+            </a:r>
+            <a:r>
+              <a:rPr lang="en-GB" dirty="0" err="1">
+                <a:solidFill>
+                  <a:srgbClr val="546BAB"/>
+                </a:solidFill>
+              </a:rPr>
+              <a:t>bootcamper</a:t>
+            </a:r>
+            <a:r>
+              <a:rPr lang="en-GB" dirty="0">
+                <a:solidFill>
+                  <a:srgbClr val="546BAB"/>
+                </a:solidFill>
+              </a:rPr>
+              <a:t> with a high activity level, I want a stress relief app </a:t>
+            </a:r>
+          </a:p>
+          <a:p>
+            <a:r>
+              <a:rPr lang="en-GB" dirty="0">
+                <a:solidFill>
+                  <a:srgbClr val="546BAB"/>
+                </a:solidFill>
+              </a:rPr>
+              <a:t>So that I can have relaxing downtime</a:t>
+            </a:r>
+          </a:p>
+        </p:txBody>
+      </p:sp>
+    </p:spTree>
+    <p:extLst>
+      <p:ext uri="{BB962C8B-B14F-4D97-AF65-F5344CB8AC3E}">
+        <p14:creationId xmlns:p14="http://schemas.microsoft.com/office/powerpoint/2010/main" val="635147060"/>
+      </p:ext>
+    </p:extLst>
+  </p:cSld>
+  <p:clrMapOvr>
+    <a:masterClrMapping/>
+  </p:clrMapOvr>
+</p:sld>
+</file>
+
+<file path=ppt/slides/slide14.xml><?xml version="1.0" encoding="utf-8"?>
+<p:sld xmlns:a="http://schemas.openxmlformats.org/drawingml/2006/main" xmlns:r="http://schemas.openxmlformats.org/officeDocument/2006/relationships" xmlns:p="http://schemas.openxmlformats.org/presentationml/2006/main">
+  <p:cSld>
+    <p:spTree>
+      <p:nvGrpSpPr>
+        <p:cNvPr id="1" name=""/>
+        <p:cNvGrpSpPr/>
+        <p:nvPr/>
+      </p:nvGrpSpPr>
+      <p:grpSpPr>
+        <a:xfrm>
+          <a:off x="0" y="0"/>
+          <a:ext cx="0" cy="0"/>
+          <a:chOff x="0" y="0"/>
+          <a:chExt cx="0" cy="0"/>
+        </a:xfrm>
+      </p:grpSpPr>
+      <p:sp>
+        <p:nvSpPr>
+          <p:cNvPr id="2" name="Title 1">
+            <a:extLst>
+              <a:ext uri="{FF2B5EF4-FFF2-40B4-BE49-F238E27FC236}">
                 <a16:creationId xmlns:a16="http://schemas.microsoft.com/office/drawing/2014/main" id="{BB75C26E-60A3-754B-1D6F-A5EC13CC5C96}"/>
               </a:ext>
             </a:extLst>
@@ -4468,7 +5020,7 @@
 </p:sld>
 </file>
 
-<file path=ppt/slides/slide13.xml><?xml version="1.0" encoding="utf-8"?>
+<file path=ppt/slides/slide15.xml><?xml version="1.0" encoding="utf-8"?>
 <p:sld xmlns:a="http://schemas.openxmlformats.org/drawingml/2006/main" xmlns:r="http://schemas.openxmlformats.org/officeDocument/2006/relationships" xmlns:p="http://schemas.openxmlformats.org/presentationml/2006/main">
   <p:cSld>
     <p:spTree>
@@ -4569,7 +5121,235 @@
 </p:sld>
 </file>
 
-<file path=ppt/slides/slide14.xml><?xml version="1.0" encoding="utf-8"?>
+<file path=ppt/slides/slide16.xml><?xml version="1.0" encoding="utf-8"?>
+<p:sld xmlns:a="http://schemas.openxmlformats.org/drawingml/2006/main" xmlns:r="http://schemas.openxmlformats.org/officeDocument/2006/relationships" xmlns:p="http://schemas.openxmlformats.org/presentationml/2006/main">
+  <p:cSld>
+    <p:spTree>
+      <p:nvGrpSpPr>
+        <p:cNvPr id="1" name=""/>
+        <p:cNvGrpSpPr/>
+        <p:nvPr/>
+      </p:nvGrpSpPr>
+      <p:grpSpPr>
+        <a:xfrm>
+          <a:off x="0" y="0"/>
+          <a:ext cx="0" cy="0"/>
+          <a:chOff x="0" y="0"/>
+          <a:chExt cx="0" cy="0"/>
+        </a:xfrm>
+      </p:grpSpPr>
+      <p:sp>
+        <p:nvSpPr>
+          <p:cNvPr id="2" name="Title 1">
+            <a:extLst>
+              <a:ext uri="{FF2B5EF4-FFF2-40B4-BE49-F238E27FC236}">
+                <a16:creationId xmlns:a16="http://schemas.microsoft.com/office/drawing/2014/main" id="{055D744C-C809-AEF2-6BF7-683025AAC96C}"/>
+              </a:ext>
+            </a:extLst>
+          </p:cNvPr>
+          <p:cNvSpPr>
+            <a:spLocks noGrp="1"/>
+          </p:cNvSpPr>
+          <p:nvPr>
+            <p:ph type="title"/>
+          </p:nvPr>
+        </p:nvSpPr>
+        <p:spPr/>
+        <p:txBody>
+          <a:bodyPr/>
+          <a:lstStyle/>
+          <a:p>
+            <a:pPr algn="ctr"/>
+            <a:r>
+              <a:rPr lang="en-GB" dirty="0">
+                <a:latin typeface="Montserrat Alternates Black" panose="00000A00000000000000" pitchFamily="2" charset="0"/>
+              </a:rPr>
+              <a:t>Agile Methodology </a:t>
+            </a:r>
+          </a:p>
+        </p:txBody>
+      </p:sp>
+      <p:pic>
+        <p:nvPicPr>
+          <p:cNvPr id="5" name="Content Placeholder 4">
+            <a:extLst>
+              <a:ext uri="{FF2B5EF4-FFF2-40B4-BE49-F238E27FC236}">
+                <a16:creationId xmlns:a16="http://schemas.microsoft.com/office/drawing/2014/main" id="{F64E1891-1BBC-35BC-B86D-0DCE07A952CA}"/>
+              </a:ext>
+            </a:extLst>
+          </p:cNvPr>
+          <p:cNvPicPr>
+            <a:picLocks noGrp="1" noChangeAspect="1"/>
+          </p:cNvPicPr>
+          <p:nvPr>
+            <p:ph idx="1"/>
+          </p:nvPr>
+        </p:nvPicPr>
+        <p:blipFill>
+          <a:blip r:embed="rId2">
+            <a:extLst>
+              <a:ext uri="{28A0092B-C50C-407E-A947-70E740481C1C}">
+                <a14:useLocalDpi xmlns:a14="http://schemas.microsoft.com/office/drawing/2010/main" val="0"/>
+              </a:ext>
+            </a:extLst>
+          </a:blip>
+          <a:stretch>
+            <a:fillRect/>
+          </a:stretch>
+        </p:blipFill>
+        <p:spPr>
+          <a:xfrm>
+            <a:off x="1033940" y="1803582"/>
+            <a:ext cx="6171882" cy="4165260"/>
+          </a:xfrm>
+        </p:spPr>
+      </p:pic>
+      <p:pic>
+        <p:nvPicPr>
+          <p:cNvPr id="7" name="Picture 6">
+            <a:extLst>
+              <a:ext uri="{FF2B5EF4-FFF2-40B4-BE49-F238E27FC236}">
+                <a16:creationId xmlns:a16="http://schemas.microsoft.com/office/drawing/2014/main" id="{EE4C8FF3-8833-C0F6-23C2-E659EA30F732}"/>
+              </a:ext>
+            </a:extLst>
+          </p:cNvPr>
+          <p:cNvPicPr>
+            <a:picLocks noChangeAspect="1"/>
+          </p:cNvPicPr>
+          <p:nvPr/>
+        </p:nvPicPr>
+        <p:blipFill>
+          <a:blip r:embed="rId3">
+            <a:extLst>
+              <a:ext uri="{28A0092B-C50C-407E-A947-70E740481C1C}">
+                <a14:useLocalDpi xmlns:a14="http://schemas.microsoft.com/office/drawing/2010/main" val="0"/>
+              </a:ext>
+            </a:extLst>
+          </a:blip>
+          <a:stretch>
+            <a:fillRect/>
+          </a:stretch>
+        </p:blipFill>
+        <p:spPr>
+          <a:xfrm>
+            <a:off x="7726680" y="1803582"/>
+            <a:ext cx="3200400" cy="3101340"/>
+          </a:xfrm>
+          <a:prstGeom prst="rect">
+            <a:avLst/>
+          </a:prstGeom>
+        </p:spPr>
+      </p:pic>
+    </p:spTree>
+    <p:extLst>
+      <p:ext uri="{BB962C8B-B14F-4D97-AF65-F5344CB8AC3E}">
+        <p14:creationId xmlns:p14="http://schemas.microsoft.com/office/powerpoint/2010/main" val="2142294636"/>
+      </p:ext>
+    </p:extLst>
+  </p:cSld>
+  <p:clrMapOvr>
+    <a:masterClrMapping/>
+  </p:clrMapOvr>
+</p:sld>
+</file>
+
+<file path=ppt/slides/slide17.xml><?xml version="1.0" encoding="utf-8"?>
+<p:sld xmlns:a="http://schemas.openxmlformats.org/drawingml/2006/main" xmlns:r="http://schemas.openxmlformats.org/officeDocument/2006/relationships" xmlns:p="http://schemas.openxmlformats.org/presentationml/2006/main">
+  <p:cSld>
+    <p:spTree>
+      <p:nvGrpSpPr>
+        <p:cNvPr id="1" name=""/>
+        <p:cNvGrpSpPr/>
+        <p:nvPr/>
+      </p:nvGrpSpPr>
+      <p:grpSpPr>
+        <a:xfrm>
+          <a:off x="0" y="0"/>
+          <a:ext cx="0" cy="0"/>
+          <a:chOff x="0" y="0"/>
+          <a:chExt cx="0" cy="0"/>
+        </a:xfrm>
+      </p:grpSpPr>
+      <p:sp>
+        <p:nvSpPr>
+          <p:cNvPr id="2" name="Title 1">
+            <a:extLst>
+              <a:ext uri="{FF2B5EF4-FFF2-40B4-BE49-F238E27FC236}">
+                <a16:creationId xmlns:a16="http://schemas.microsoft.com/office/drawing/2014/main" id="{973EB2AE-E4E7-809C-4007-9984B73EAECC}"/>
+              </a:ext>
+            </a:extLst>
+          </p:cNvPr>
+          <p:cNvSpPr>
+            <a:spLocks noGrp="1"/>
+          </p:cNvSpPr>
+          <p:nvPr>
+            <p:ph type="title"/>
+          </p:nvPr>
+        </p:nvSpPr>
+        <p:spPr/>
+        <p:txBody>
+          <a:bodyPr/>
+          <a:lstStyle/>
+          <a:p>
+            <a:pPr algn="ctr"/>
+            <a:r>
+              <a:rPr lang="en-GB" dirty="0">
+                <a:latin typeface="Montserrat Alternates Black" panose="00000A00000000000000" pitchFamily="2" charset="0"/>
+              </a:rPr>
+              <a:t>Daily Scrum Ceremonies</a:t>
+            </a:r>
+          </a:p>
+        </p:txBody>
+      </p:sp>
+      <p:pic>
+        <p:nvPicPr>
+          <p:cNvPr id="9" name="Content Placeholder 8">
+            <a:extLst>
+              <a:ext uri="{FF2B5EF4-FFF2-40B4-BE49-F238E27FC236}">
+                <a16:creationId xmlns:a16="http://schemas.microsoft.com/office/drawing/2014/main" id="{CA653F1C-A459-4649-4541-7AA62D601687}"/>
+              </a:ext>
+            </a:extLst>
+          </p:cNvPr>
+          <p:cNvPicPr>
+            <a:picLocks noGrp="1" noChangeAspect="1"/>
+          </p:cNvPicPr>
+          <p:nvPr>
+            <p:ph idx="1"/>
+          </p:nvPr>
+        </p:nvPicPr>
+        <p:blipFill>
+          <a:blip r:embed="rId2">
+            <a:extLst>
+              <a:ext uri="{28A0092B-C50C-407E-A947-70E740481C1C}">
+                <a14:useLocalDpi xmlns:a14="http://schemas.microsoft.com/office/drawing/2010/main" val="0"/>
+              </a:ext>
+            </a:extLst>
+          </a:blip>
+          <a:stretch>
+            <a:fillRect/>
+          </a:stretch>
+        </p:blipFill>
+        <p:spPr>
+          <a:xfrm>
+            <a:off x="1514054" y="1690688"/>
+            <a:ext cx="8896312" cy="4486275"/>
+          </a:xfrm>
+        </p:spPr>
+      </p:pic>
+    </p:spTree>
+    <p:extLst>
+      <p:ext uri="{BB962C8B-B14F-4D97-AF65-F5344CB8AC3E}">
+        <p14:creationId xmlns:p14="http://schemas.microsoft.com/office/powerpoint/2010/main" val="142390007"/>
+      </p:ext>
+    </p:extLst>
+  </p:cSld>
+  <p:clrMapOvr>
+    <a:masterClrMapping/>
+  </p:clrMapOvr>
+</p:sld>
+</file>
+
+<file path=ppt/slides/slide18.xml><?xml version="1.0" encoding="utf-8"?>
 <p:sld xmlns:a="http://schemas.openxmlformats.org/drawingml/2006/main" xmlns:r="http://schemas.openxmlformats.org/officeDocument/2006/relationships" xmlns:p="http://schemas.openxmlformats.org/presentationml/2006/main">
   <p:cSld>
     <p:spTree>
@@ -4719,7 +5499,7 @@
 </p:sld>
 </file>
 
-<file path=ppt/slides/slide15.xml><?xml version="1.0" encoding="utf-8"?>
+<file path=ppt/slides/slide19.xml><?xml version="1.0" encoding="utf-8"?>
 <p:sld xmlns:a="http://schemas.openxmlformats.org/drawingml/2006/main" xmlns:r="http://schemas.openxmlformats.org/officeDocument/2006/relationships" xmlns:p="http://schemas.openxmlformats.org/presentationml/2006/main">
   <p:cSld>
     <p:spTree>
@@ -4757,37 +5537,565 @@
           <a:bodyPr/>
           <a:lstStyle/>
           <a:p>
-            <a:endParaRPr lang="en-GB">
-              <a:latin typeface="Montserrat Alternates Black" panose="00000A00000000000000" pitchFamily="2" charset="0"/>
-            </a:endParaRPr>
-          </a:p>
-        </p:txBody>
-      </p:sp>
-      <p:sp>
-        <p:nvSpPr>
-          <p:cNvPr id="3" name="Content Placeholder 2">
-            <a:extLst>
-              <a:ext uri="{FF2B5EF4-FFF2-40B4-BE49-F238E27FC236}">
-                <a16:creationId xmlns:a16="http://schemas.microsoft.com/office/drawing/2014/main" id="{C6A9D786-0061-059F-97D5-45FC84AA8D2E}"/>
-              </a:ext>
-            </a:extLst>
-          </p:cNvPr>
-          <p:cNvSpPr>
-            <a:spLocks noGrp="1"/>
-          </p:cNvSpPr>
-          <p:nvPr>
-            <p:ph idx="1"/>
-          </p:nvPr>
-        </p:nvSpPr>
-        <p:spPr/>
-        <p:txBody>
-          <a:bodyPr/>
+            <a:pPr algn="ctr"/>
+            <a:r>
+              <a:rPr lang="en-GB" dirty="0">
+                <a:latin typeface="Montserrat Alternates Black" panose="00000A00000000000000" pitchFamily="2" charset="0"/>
+              </a:rPr>
+              <a:t>Tech Stack</a:t>
+            </a:r>
+          </a:p>
+        </p:txBody>
+      </p:sp>
+      <p:sp>
+        <p:nvSpPr>
+          <p:cNvPr id="4" name="TextBox 3">
+            <a:extLst>
+              <a:ext uri="{FF2B5EF4-FFF2-40B4-BE49-F238E27FC236}">
+                <a16:creationId xmlns:a16="http://schemas.microsoft.com/office/drawing/2014/main" id="{7F4E3D2C-3525-213B-BE84-8961C1ADD6F8}"/>
+              </a:ext>
+            </a:extLst>
+          </p:cNvPr>
+          <p:cNvSpPr txBox="1"/>
+          <p:nvPr/>
+        </p:nvSpPr>
+        <p:spPr>
+          <a:xfrm>
+            <a:off x="1795115" y="1988990"/>
+            <a:ext cx="1648208" cy="461665"/>
+          </a:xfrm>
+          <a:prstGeom prst="rect">
+            <a:avLst/>
+          </a:prstGeom>
+          <a:noFill/>
+        </p:spPr>
+        <p:txBody>
+          <a:bodyPr wrap="none" rtlCol="0">
+            <a:spAutoFit/>
+          </a:bodyPr>
           <a:lstStyle/>
           <a:p>
-            <a:endParaRPr lang="en-GB"/>
-          </a:p>
-        </p:txBody>
-      </p:sp>
+            <a:r>
+              <a:rPr lang="en-GB" sz="2000" dirty="0">
+                <a:latin typeface="Montserrat Alternates Black" panose="00000A00000000000000" pitchFamily="2" charset="0"/>
+              </a:rPr>
+              <a:t>Front </a:t>
+            </a:r>
+            <a:r>
+              <a:rPr lang="en-GB" sz="2400" dirty="0">
+                <a:latin typeface="Montserrat Alternates Black" panose="00000A00000000000000" pitchFamily="2" charset="0"/>
+              </a:rPr>
+              <a:t>End</a:t>
+            </a:r>
+          </a:p>
+        </p:txBody>
+      </p:sp>
+      <p:sp>
+        <p:nvSpPr>
+          <p:cNvPr id="11" name="TextBox 10">
+            <a:extLst>
+              <a:ext uri="{FF2B5EF4-FFF2-40B4-BE49-F238E27FC236}">
+                <a16:creationId xmlns:a16="http://schemas.microsoft.com/office/drawing/2014/main" id="{408D9C59-AFF4-F2DC-3DD7-38883079C401}"/>
+              </a:ext>
+            </a:extLst>
+          </p:cNvPr>
+          <p:cNvSpPr txBox="1"/>
+          <p:nvPr/>
+        </p:nvSpPr>
+        <p:spPr>
+          <a:xfrm>
+            <a:off x="5230691" y="1921416"/>
+            <a:ext cx="1784463" cy="461665"/>
+          </a:xfrm>
+          <a:prstGeom prst="rect">
+            <a:avLst/>
+          </a:prstGeom>
+          <a:noFill/>
+        </p:spPr>
+        <p:txBody>
+          <a:bodyPr wrap="none" rtlCol="0">
+            <a:spAutoFit/>
+          </a:bodyPr>
+          <a:lstStyle/>
+          <a:p>
+            <a:r>
+              <a:rPr lang="en-GB" sz="2400" dirty="0">
+                <a:latin typeface="Montserrat Alternates Black" panose="00000A00000000000000" pitchFamily="2" charset="0"/>
+              </a:rPr>
+              <a:t>Back End</a:t>
+            </a:r>
+          </a:p>
+        </p:txBody>
+      </p:sp>
+      <p:sp>
+        <p:nvSpPr>
+          <p:cNvPr id="12" name="TextBox 11">
+            <a:extLst>
+              <a:ext uri="{FF2B5EF4-FFF2-40B4-BE49-F238E27FC236}">
+                <a16:creationId xmlns:a16="http://schemas.microsoft.com/office/drawing/2014/main" id="{C6A3C00A-8983-F785-89C6-F9B503135D44}"/>
+              </a:ext>
+            </a:extLst>
+          </p:cNvPr>
+          <p:cNvSpPr txBox="1"/>
+          <p:nvPr/>
+        </p:nvSpPr>
+        <p:spPr>
+          <a:xfrm>
+            <a:off x="8958671" y="1921416"/>
+            <a:ext cx="1438214" cy="461665"/>
+          </a:xfrm>
+          <a:prstGeom prst="rect">
+            <a:avLst/>
+          </a:prstGeom>
+          <a:noFill/>
+        </p:spPr>
+        <p:txBody>
+          <a:bodyPr wrap="none" rtlCol="0">
+            <a:spAutoFit/>
+          </a:bodyPr>
+          <a:lstStyle/>
+          <a:p>
+            <a:r>
+              <a:rPr lang="en-GB" sz="2400" dirty="0">
+                <a:latin typeface="Montserrat Alternates Black" panose="00000A00000000000000" pitchFamily="2" charset="0"/>
+              </a:rPr>
+              <a:t>Testing</a:t>
+            </a:r>
+          </a:p>
+        </p:txBody>
+      </p:sp>
+      <p:pic>
+        <p:nvPicPr>
+          <p:cNvPr id="14" name="Picture 13">
+            <a:extLst>
+              <a:ext uri="{FF2B5EF4-FFF2-40B4-BE49-F238E27FC236}">
+                <a16:creationId xmlns:a16="http://schemas.microsoft.com/office/drawing/2014/main" id="{165E8033-B4C9-F5F5-A4A3-32C189DAC61E}"/>
+              </a:ext>
+            </a:extLst>
+          </p:cNvPr>
+          <p:cNvPicPr>
+            <a:picLocks noChangeAspect="1"/>
+          </p:cNvPicPr>
+          <p:nvPr/>
+        </p:nvPicPr>
+        <p:blipFill>
+          <a:blip r:embed="rId2">
+            <a:extLst>
+              <a:ext uri="{28A0092B-C50C-407E-A947-70E740481C1C}">
+                <a14:useLocalDpi xmlns:a14="http://schemas.microsoft.com/office/drawing/2010/main" val="0"/>
+              </a:ext>
+            </a:extLst>
+          </a:blip>
+          <a:stretch>
+            <a:fillRect/>
+          </a:stretch>
+        </p:blipFill>
+        <p:spPr>
+          <a:xfrm>
+            <a:off x="1391812" y="2844540"/>
+            <a:ext cx="1107224" cy="962803"/>
+          </a:xfrm>
+          <a:prstGeom prst="rect">
+            <a:avLst/>
+          </a:prstGeom>
+        </p:spPr>
+      </p:pic>
+      <p:pic>
+        <p:nvPicPr>
+          <p:cNvPr id="16" name="Picture 15">
+            <a:extLst>
+              <a:ext uri="{FF2B5EF4-FFF2-40B4-BE49-F238E27FC236}">
+                <a16:creationId xmlns:a16="http://schemas.microsoft.com/office/drawing/2014/main" id="{DA4E26AB-0CFF-26CD-72A6-215CA44DBA0B}"/>
+              </a:ext>
+            </a:extLst>
+          </p:cNvPr>
+          <p:cNvPicPr>
+            <a:picLocks noChangeAspect="1"/>
+          </p:cNvPicPr>
+          <p:nvPr/>
+        </p:nvPicPr>
+        <p:blipFill>
+          <a:blip r:embed="rId3">
+            <a:extLst>
+              <a:ext uri="{28A0092B-C50C-407E-A947-70E740481C1C}">
+                <a14:useLocalDpi xmlns:a14="http://schemas.microsoft.com/office/drawing/2010/main" val="0"/>
+              </a:ext>
+            </a:extLst>
+          </a:blip>
+          <a:stretch>
+            <a:fillRect/>
+          </a:stretch>
+        </p:blipFill>
+        <p:spPr>
+          <a:xfrm>
+            <a:off x="2628900" y="2702170"/>
+            <a:ext cx="998220" cy="998220"/>
+          </a:xfrm>
+          <a:prstGeom prst="rect">
+            <a:avLst/>
+          </a:prstGeom>
+        </p:spPr>
+      </p:pic>
+      <p:pic>
+        <p:nvPicPr>
+          <p:cNvPr id="18" name="Picture 17">
+            <a:extLst>
+              <a:ext uri="{FF2B5EF4-FFF2-40B4-BE49-F238E27FC236}">
+                <a16:creationId xmlns:a16="http://schemas.microsoft.com/office/drawing/2014/main" id="{CC11BEF4-9036-C94A-4CE3-3168BE575CBA}"/>
+              </a:ext>
+            </a:extLst>
+          </p:cNvPr>
+          <p:cNvPicPr>
+            <a:picLocks noChangeAspect="1"/>
+          </p:cNvPicPr>
+          <p:nvPr/>
+        </p:nvPicPr>
+        <p:blipFill>
+          <a:blip r:embed="rId4">
+            <a:extLst>
+              <a:ext uri="{28A0092B-C50C-407E-A947-70E740481C1C}">
+                <a14:useLocalDpi xmlns:a14="http://schemas.microsoft.com/office/drawing/2010/main" val="0"/>
+              </a:ext>
+            </a:extLst>
+          </a:blip>
+          <a:stretch>
+            <a:fillRect/>
+          </a:stretch>
+        </p:blipFill>
+        <p:spPr>
+          <a:xfrm>
+            <a:off x="1588390" y="4013460"/>
+            <a:ext cx="714068" cy="1007170"/>
+          </a:xfrm>
+          <a:prstGeom prst="rect">
+            <a:avLst/>
+          </a:prstGeom>
+        </p:spPr>
+      </p:pic>
+      <p:pic>
+        <p:nvPicPr>
+          <p:cNvPr id="20" name="Picture 19">
+            <a:extLst>
+              <a:ext uri="{FF2B5EF4-FFF2-40B4-BE49-F238E27FC236}">
+                <a16:creationId xmlns:a16="http://schemas.microsoft.com/office/drawing/2014/main" id="{C045CDAB-7657-5695-AD9C-968A8E21CDEC}"/>
+              </a:ext>
+            </a:extLst>
+          </p:cNvPr>
+          <p:cNvPicPr>
+            <a:picLocks noChangeAspect="1"/>
+          </p:cNvPicPr>
+          <p:nvPr/>
+        </p:nvPicPr>
+        <p:blipFill>
+          <a:blip r:embed="rId5">
+            <a:extLst>
+              <a:ext uri="{28A0092B-C50C-407E-A947-70E740481C1C}">
+                <a14:useLocalDpi xmlns:a14="http://schemas.microsoft.com/office/drawing/2010/main" val="0"/>
+              </a:ext>
+            </a:extLst>
+          </a:blip>
+          <a:stretch>
+            <a:fillRect/>
+          </a:stretch>
+        </p:blipFill>
+        <p:spPr>
+          <a:xfrm>
+            <a:off x="2628900" y="4013460"/>
+            <a:ext cx="714068" cy="1005729"/>
+          </a:xfrm>
+          <a:prstGeom prst="rect">
+            <a:avLst/>
+          </a:prstGeom>
+        </p:spPr>
+      </p:pic>
+      <p:pic>
+        <p:nvPicPr>
+          <p:cNvPr id="22" name="Picture 21">
+            <a:extLst>
+              <a:ext uri="{FF2B5EF4-FFF2-40B4-BE49-F238E27FC236}">
+                <a16:creationId xmlns:a16="http://schemas.microsoft.com/office/drawing/2014/main" id="{2F142E06-6AC3-8C5B-17B6-0480AFEF55D0}"/>
+              </a:ext>
+            </a:extLst>
+          </p:cNvPr>
+          <p:cNvPicPr>
+            <a:picLocks noChangeAspect="1"/>
+          </p:cNvPicPr>
+          <p:nvPr/>
+        </p:nvPicPr>
+        <p:blipFill>
+          <a:blip r:embed="rId6">
+            <a:extLst>
+              <a:ext uri="{28A0092B-C50C-407E-A947-70E740481C1C}">
+                <a14:useLocalDpi xmlns:a14="http://schemas.microsoft.com/office/drawing/2010/main" val="0"/>
+              </a:ext>
+            </a:extLst>
+          </a:blip>
+          <a:stretch>
+            <a:fillRect/>
+          </a:stretch>
+        </p:blipFill>
+        <p:spPr>
+          <a:xfrm>
+            <a:off x="4723759" y="2702170"/>
+            <a:ext cx="2530947" cy="707874"/>
+          </a:xfrm>
+          <a:prstGeom prst="rect">
+            <a:avLst/>
+          </a:prstGeom>
+        </p:spPr>
+      </p:pic>
+      <p:pic>
+        <p:nvPicPr>
+          <p:cNvPr id="34" name="Picture 33">
+            <a:extLst>
+              <a:ext uri="{FF2B5EF4-FFF2-40B4-BE49-F238E27FC236}">
+                <a16:creationId xmlns:a16="http://schemas.microsoft.com/office/drawing/2014/main" id="{0934699E-2792-2E3E-3EF9-7B102AE50AA4}"/>
+              </a:ext>
+            </a:extLst>
+          </p:cNvPr>
+          <p:cNvPicPr>
+            <a:picLocks noChangeAspect="1"/>
+          </p:cNvPicPr>
+          <p:nvPr/>
+        </p:nvPicPr>
+        <p:blipFill>
+          <a:blip r:embed="rId7">
+            <a:extLst>
+              <a:ext uri="{28A0092B-C50C-407E-A947-70E740481C1C}">
+                <a14:useLocalDpi xmlns:a14="http://schemas.microsoft.com/office/drawing/2010/main" val="0"/>
+              </a:ext>
+            </a:extLst>
+          </a:blip>
+          <a:stretch>
+            <a:fillRect/>
+          </a:stretch>
+        </p:blipFill>
+        <p:spPr>
+          <a:xfrm>
+            <a:off x="6439205" y="3586872"/>
+            <a:ext cx="1774506" cy="1621898"/>
+          </a:xfrm>
+          <a:prstGeom prst="rect">
+            <a:avLst/>
+          </a:prstGeom>
+        </p:spPr>
+      </p:pic>
+      <p:pic>
+        <p:nvPicPr>
+          <p:cNvPr id="36" name="Picture 35">
+            <a:extLst>
+              <a:ext uri="{FF2B5EF4-FFF2-40B4-BE49-F238E27FC236}">
+                <a16:creationId xmlns:a16="http://schemas.microsoft.com/office/drawing/2014/main" id="{EFE15EAA-FAD4-4EE2-B20D-ED103D673E0F}"/>
+              </a:ext>
+            </a:extLst>
+          </p:cNvPr>
+          <p:cNvPicPr>
+            <a:picLocks noChangeAspect="1"/>
+          </p:cNvPicPr>
+          <p:nvPr/>
+        </p:nvPicPr>
+        <p:blipFill>
+          <a:blip r:embed="rId8">
+            <a:extLst>
+              <a:ext uri="{28A0092B-C50C-407E-A947-70E740481C1C}">
+                <a14:useLocalDpi xmlns:a14="http://schemas.microsoft.com/office/drawing/2010/main" val="0"/>
+              </a:ext>
+            </a:extLst>
+          </a:blip>
+          <a:stretch>
+            <a:fillRect/>
+          </a:stretch>
+        </p:blipFill>
+        <p:spPr>
+          <a:xfrm>
+            <a:off x="4597490" y="3586872"/>
+            <a:ext cx="1841715" cy="1122997"/>
+          </a:xfrm>
+          <a:prstGeom prst="rect">
+            <a:avLst/>
+          </a:prstGeom>
+        </p:spPr>
+      </p:pic>
+      <p:pic>
+        <p:nvPicPr>
+          <p:cNvPr id="38" name="Picture 37">
+            <a:extLst>
+              <a:ext uri="{FF2B5EF4-FFF2-40B4-BE49-F238E27FC236}">
+                <a16:creationId xmlns:a16="http://schemas.microsoft.com/office/drawing/2014/main" id="{2CF3F238-396D-9F12-4281-00E835E502F4}"/>
+              </a:ext>
+            </a:extLst>
+          </p:cNvPr>
+          <p:cNvPicPr>
+            <a:picLocks noChangeAspect="1"/>
+          </p:cNvPicPr>
+          <p:nvPr/>
+        </p:nvPicPr>
+        <p:blipFill>
+          <a:blip r:embed="rId9">
+            <a:extLst>
+              <a:ext uri="{28A0092B-C50C-407E-A947-70E740481C1C}">
+                <a14:useLocalDpi xmlns:a14="http://schemas.microsoft.com/office/drawing/2010/main" val="0"/>
+              </a:ext>
+            </a:extLst>
+          </a:blip>
+          <a:stretch>
+            <a:fillRect/>
+          </a:stretch>
+        </p:blipFill>
+        <p:spPr>
+          <a:xfrm>
+            <a:off x="4720872" y="4892101"/>
+            <a:ext cx="1777359" cy="538941"/>
+          </a:xfrm>
+          <a:prstGeom prst="rect">
+            <a:avLst/>
+          </a:prstGeom>
+        </p:spPr>
+      </p:pic>
+      <p:pic>
+        <p:nvPicPr>
+          <p:cNvPr id="40" name="Picture 39">
+            <a:extLst>
+              <a:ext uri="{FF2B5EF4-FFF2-40B4-BE49-F238E27FC236}">
+                <a16:creationId xmlns:a16="http://schemas.microsoft.com/office/drawing/2014/main" id="{612733AC-6D46-F3E8-16A0-97AF6838C1D2}"/>
+              </a:ext>
+            </a:extLst>
+          </p:cNvPr>
+          <p:cNvPicPr>
+            <a:picLocks noChangeAspect="1"/>
+          </p:cNvPicPr>
+          <p:nvPr/>
+        </p:nvPicPr>
+        <p:blipFill>
+          <a:blip r:embed="rId10">
+            <a:extLst>
+              <a:ext uri="{28A0092B-C50C-407E-A947-70E740481C1C}">
+                <a14:useLocalDpi xmlns:a14="http://schemas.microsoft.com/office/drawing/2010/main" val="0"/>
+              </a:ext>
+            </a:extLst>
+          </a:blip>
+          <a:stretch>
+            <a:fillRect/>
+          </a:stretch>
+        </p:blipFill>
+        <p:spPr>
+          <a:xfrm>
+            <a:off x="1387240" y="4998087"/>
+            <a:ext cx="2356557" cy="1325563"/>
+          </a:xfrm>
+          <a:prstGeom prst="rect">
+            <a:avLst/>
+          </a:prstGeom>
+        </p:spPr>
+      </p:pic>
+      <p:pic>
+        <p:nvPicPr>
+          <p:cNvPr id="42" name="Picture 41">
+            <a:extLst>
+              <a:ext uri="{FF2B5EF4-FFF2-40B4-BE49-F238E27FC236}">
+                <a16:creationId xmlns:a16="http://schemas.microsoft.com/office/drawing/2014/main" id="{6CE934B8-7219-A6B4-4B41-10088F86B885}"/>
+              </a:ext>
+            </a:extLst>
+          </p:cNvPr>
+          <p:cNvPicPr>
+            <a:picLocks noChangeAspect="1"/>
+          </p:cNvPicPr>
+          <p:nvPr/>
+        </p:nvPicPr>
+        <p:blipFill>
+          <a:blip r:embed="rId11">
+            <a:extLst>
+              <a:ext uri="{28A0092B-C50C-407E-A947-70E740481C1C}">
+                <a14:useLocalDpi xmlns:a14="http://schemas.microsoft.com/office/drawing/2010/main" val="0"/>
+              </a:ext>
+            </a:extLst>
+          </a:blip>
+          <a:stretch>
+            <a:fillRect/>
+          </a:stretch>
+        </p:blipFill>
+        <p:spPr>
+          <a:xfrm>
+            <a:off x="10350943" y="2809111"/>
+            <a:ext cx="1124066" cy="1239778"/>
+          </a:xfrm>
+          <a:prstGeom prst="rect">
+            <a:avLst/>
+          </a:prstGeom>
+        </p:spPr>
+      </p:pic>
+      <p:pic>
+        <p:nvPicPr>
+          <p:cNvPr id="44" name="Picture 43">
+            <a:extLst>
+              <a:ext uri="{FF2B5EF4-FFF2-40B4-BE49-F238E27FC236}">
+                <a16:creationId xmlns:a16="http://schemas.microsoft.com/office/drawing/2014/main" id="{97879486-FF97-B48A-4001-3DF2098FB9F5}"/>
+              </a:ext>
+            </a:extLst>
+          </p:cNvPr>
+          <p:cNvPicPr>
+            <a:picLocks noChangeAspect="1"/>
+          </p:cNvPicPr>
+          <p:nvPr/>
+        </p:nvPicPr>
+        <p:blipFill>
+          <a:blip r:embed="rId12">
+            <a:extLst>
+              <a:ext uri="{28A0092B-C50C-407E-A947-70E740481C1C}">
+                <a14:useLocalDpi xmlns:a14="http://schemas.microsoft.com/office/drawing/2010/main" val="0"/>
+              </a:ext>
+            </a:extLst>
+          </a:blip>
+          <a:stretch>
+            <a:fillRect/>
+          </a:stretch>
+        </p:blipFill>
+        <p:spPr>
+          <a:xfrm>
+            <a:off x="8958671" y="3451427"/>
+            <a:ext cx="1124066" cy="1124066"/>
+          </a:xfrm>
+          <a:prstGeom prst="rect">
+            <a:avLst/>
+          </a:prstGeom>
+        </p:spPr>
+      </p:pic>
+      <p:pic>
+        <p:nvPicPr>
+          <p:cNvPr id="46" name="Picture 45">
+            <a:extLst>
+              <a:ext uri="{FF2B5EF4-FFF2-40B4-BE49-F238E27FC236}">
+                <a16:creationId xmlns:a16="http://schemas.microsoft.com/office/drawing/2014/main" id="{DDBB1501-D907-7141-0EED-1CF8FCB3874B}"/>
+              </a:ext>
+            </a:extLst>
+          </p:cNvPr>
+          <p:cNvPicPr>
+            <a:picLocks noChangeAspect="1"/>
+          </p:cNvPicPr>
+          <p:nvPr/>
+        </p:nvPicPr>
+        <p:blipFill>
+          <a:blip r:embed="rId13">
+            <a:extLst>
+              <a:ext uri="{28A0092B-C50C-407E-A947-70E740481C1C}">
+                <a14:useLocalDpi xmlns:a14="http://schemas.microsoft.com/office/drawing/2010/main" val="0"/>
+              </a:ext>
+            </a:extLst>
+          </a:blip>
+          <a:stretch>
+            <a:fillRect/>
+          </a:stretch>
+        </p:blipFill>
+        <p:spPr>
+          <a:xfrm>
+            <a:off x="8740773" y="2729486"/>
+            <a:ext cx="1812443" cy="560210"/>
+          </a:xfrm>
+          <a:prstGeom prst="rect">
+            <a:avLst/>
+          </a:prstGeom>
+        </p:spPr>
+      </p:pic>
     </p:spTree>
     <p:extLst>
       <p:ext uri="{BB962C8B-B14F-4D97-AF65-F5344CB8AC3E}">
@@ -5393,6 +6701,178 @@
       </p:par>
     </p:tnLst>
   </p:timing>
+</p:sld>
+</file>
+
+<file path=ppt/slides/slide20.xml><?xml version="1.0" encoding="utf-8"?>
+<p:sld xmlns:a="http://schemas.openxmlformats.org/drawingml/2006/main" xmlns:r="http://schemas.openxmlformats.org/officeDocument/2006/relationships" xmlns:p="http://schemas.openxmlformats.org/presentationml/2006/main">
+  <p:cSld>
+    <p:spTree>
+      <p:nvGrpSpPr>
+        <p:cNvPr id="1" name=""/>
+        <p:cNvGrpSpPr/>
+        <p:nvPr/>
+      </p:nvGrpSpPr>
+      <p:grpSpPr>
+        <a:xfrm>
+          <a:off x="0" y="0"/>
+          <a:ext cx="0" cy="0"/>
+          <a:chOff x="0" y="0"/>
+          <a:chExt cx="0" cy="0"/>
+        </a:xfrm>
+      </p:grpSpPr>
+      <p:sp>
+        <p:nvSpPr>
+          <p:cNvPr id="2" name="Title 1">
+            <a:extLst>
+              <a:ext uri="{FF2B5EF4-FFF2-40B4-BE49-F238E27FC236}">
+                <a16:creationId xmlns:a16="http://schemas.microsoft.com/office/drawing/2014/main" id="{A111C808-0031-4B59-790B-399927B7EE77}"/>
+              </a:ext>
+            </a:extLst>
+          </p:cNvPr>
+          <p:cNvSpPr>
+            <a:spLocks noGrp="1"/>
+          </p:cNvSpPr>
+          <p:nvPr>
+            <p:ph type="title"/>
+          </p:nvPr>
+        </p:nvSpPr>
+        <p:spPr/>
+        <p:txBody>
+          <a:bodyPr/>
+          <a:lstStyle/>
+          <a:p>
+            <a:pPr algn="ctr"/>
+            <a:r>
+              <a:rPr lang="en-GB" dirty="0">
+                <a:latin typeface="Montserrat Alternates Black" panose="00000A00000000000000" pitchFamily="2" charset="0"/>
+              </a:rPr>
+              <a:t>Future Implementations</a:t>
+            </a:r>
+          </a:p>
+        </p:txBody>
+      </p:sp>
+      <p:sp>
+        <p:nvSpPr>
+          <p:cNvPr id="3" name="Content Placeholder 2">
+            <a:extLst>
+              <a:ext uri="{FF2B5EF4-FFF2-40B4-BE49-F238E27FC236}">
+                <a16:creationId xmlns:a16="http://schemas.microsoft.com/office/drawing/2014/main" id="{E919DFF0-8BBF-1DE1-208D-B4B91F08D2FA}"/>
+              </a:ext>
+            </a:extLst>
+          </p:cNvPr>
+          <p:cNvSpPr>
+            <a:spLocks noGrp="1"/>
+          </p:cNvSpPr>
+          <p:nvPr>
+            <p:ph idx="1"/>
+          </p:nvPr>
+        </p:nvSpPr>
+        <p:spPr/>
+        <p:txBody>
+          <a:bodyPr/>
+          <a:lstStyle/>
+          <a:p>
+            <a:endParaRPr lang="en-GB"/>
+          </a:p>
+        </p:txBody>
+      </p:sp>
+    </p:spTree>
+    <p:extLst>
+      <p:ext uri="{BB962C8B-B14F-4D97-AF65-F5344CB8AC3E}">
+        <p14:creationId xmlns:p14="http://schemas.microsoft.com/office/powerpoint/2010/main" val="3676240030"/>
+      </p:ext>
+    </p:extLst>
+  </p:cSld>
+  <p:clrMapOvr>
+    <a:masterClrMapping/>
+  </p:clrMapOvr>
+</p:sld>
+</file>
+
+<file path=ppt/slides/slide21.xml><?xml version="1.0" encoding="utf-8"?>
+<p:sld xmlns:a="http://schemas.openxmlformats.org/drawingml/2006/main" xmlns:r="http://schemas.openxmlformats.org/officeDocument/2006/relationships" xmlns:p="http://schemas.openxmlformats.org/presentationml/2006/main">
+  <p:cSld>
+    <p:spTree>
+      <p:nvGrpSpPr>
+        <p:cNvPr id="1" name=""/>
+        <p:cNvGrpSpPr/>
+        <p:nvPr/>
+      </p:nvGrpSpPr>
+      <p:grpSpPr>
+        <a:xfrm>
+          <a:off x="0" y="0"/>
+          <a:ext cx="0" cy="0"/>
+          <a:chOff x="0" y="0"/>
+          <a:chExt cx="0" cy="0"/>
+        </a:xfrm>
+      </p:grpSpPr>
+      <p:sp>
+        <p:nvSpPr>
+          <p:cNvPr id="2" name="Title 1">
+            <a:extLst>
+              <a:ext uri="{FF2B5EF4-FFF2-40B4-BE49-F238E27FC236}">
+                <a16:creationId xmlns:a16="http://schemas.microsoft.com/office/drawing/2014/main" id="{4A9AAB33-CB8B-62A8-9130-859D0C0EE918}"/>
+              </a:ext>
+            </a:extLst>
+          </p:cNvPr>
+          <p:cNvSpPr>
+            <a:spLocks noGrp="1"/>
+          </p:cNvSpPr>
+          <p:nvPr>
+            <p:ph type="title"/>
+          </p:nvPr>
+        </p:nvSpPr>
+        <p:spPr/>
+        <p:txBody>
+          <a:bodyPr/>
+          <a:lstStyle/>
+          <a:p>
+            <a:pPr algn="ctr"/>
+            <a:r>
+              <a:rPr lang="en-GB" dirty="0">
+                <a:latin typeface="Montserrat Alternates Black" panose="00000A00000000000000" pitchFamily="2" charset="0"/>
+              </a:rPr>
+              <a:t>Challenges</a:t>
+            </a:r>
+          </a:p>
+        </p:txBody>
+      </p:sp>
+      <p:sp>
+        <p:nvSpPr>
+          <p:cNvPr id="3" name="Content Placeholder 2">
+            <a:extLst>
+              <a:ext uri="{FF2B5EF4-FFF2-40B4-BE49-F238E27FC236}">
+                <a16:creationId xmlns:a16="http://schemas.microsoft.com/office/drawing/2014/main" id="{5F97AE77-A422-0978-BAA4-41B5D9B8D46A}"/>
+              </a:ext>
+            </a:extLst>
+          </p:cNvPr>
+          <p:cNvSpPr>
+            <a:spLocks noGrp="1"/>
+          </p:cNvSpPr>
+          <p:nvPr>
+            <p:ph idx="1"/>
+          </p:nvPr>
+        </p:nvSpPr>
+        <p:spPr/>
+        <p:txBody>
+          <a:bodyPr/>
+          <a:lstStyle/>
+          <a:p>
+            <a:endParaRPr lang="en-GB" dirty="0"/>
+          </a:p>
+        </p:txBody>
+      </p:sp>
+    </p:spTree>
+    <p:extLst>
+      <p:ext uri="{BB962C8B-B14F-4D97-AF65-F5344CB8AC3E}">
+        <p14:creationId xmlns:p14="http://schemas.microsoft.com/office/powerpoint/2010/main" val="2612835651"/>
+      </p:ext>
+    </p:extLst>
+  </p:cSld>
+  <p:clrMapOvr>
+    <a:masterClrMapping/>
+  </p:clrMapOvr>
 </p:sld>
 </file>
 

</xml_diff>